<commit_message>
Update session 14 documents.
</commit_message>
<xml_diff>
--- a/CPSC-24700/Presentations/session-14.pptx
+++ b/CPSC-24700/Presentations/session-14.pptx
@@ -5,14 +5,15 @@
     <p:sldMasterId id="2147483648" r:id="rId1"/>
   </p:sldMasterIdLst>
   <p:notesMasterIdLst>
-    <p:notesMasterId r:id="rId7"/>
+    <p:notesMasterId r:id="rId8"/>
   </p:notesMasterIdLst>
   <p:sldIdLst>
     <p:sldId id="257" r:id="rId2"/>
     <p:sldId id="291" r:id="rId3"/>
     <p:sldId id="295" r:id="rId4"/>
     <p:sldId id="298" r:id="rId5"/>
-    <p:sldId id="263" r:id="rId6"/>
+    <p:sldId id="299" r:id="rId6"/>
+    <p:sldId id="263" r:id="rId7"/>
   </p:sldIdLst>
   <p:sldSz cx="12192000" cy="6858000"/>
   <p:notesSz cx="7315200" cy="9601200"/>
@@ -119,6 +120,10 @@
 </p:presentation>
 </file>
 
+<file path=ppt/revisionInfo.xml><?xml version="1.0" encoding="utf-8"?>
+<p1510:revInfo xmlns:a="http://schemas.openxmlformats.org/drawingml/2006/main" xmlns:r="http://schemas.openxmlformats.org/officeDocument/2006/relationships" xmlns:p1510="http://schemas.microsoft.com/office/powerpoint/2015/10/main"/>
+</file>
+
 <file path=ppt/notesMasters/notesMaster1.xml><?xml version="1.0" encoding="utf-8"?>
 <p:notesMaster xmlns:a="http://schemas.openxmlformats.org/drawingml/2006/main" xmlns:r="http://schemas.openxmlformats.org/officeDocument/2006/relationships" xmlns:p="http://schemas.openxmlformats.org/presentationml/2006/main">
   <p:cSld>
@@ -201,7 +206,7 @@
           <a:p>
             <a:fld id="{1CF91C02-A59E-4778-8D4F-4840DBBEFA68}" type="datetimeFigureOut">
               <a:rPr lang="en-US" smtClean="0"/>
-              <a:t>9/28/2017</a:t>
+              <a:t>9/29/2017</a:t>
             </a:fld>
             <a:endParaRPr lang="en-US"/>
           </a:p>
@@ -856,6 +861,14 @@
           <a:bodyPr/>
           <a:lstStyle/>
           <a:p>
+            <a:r>
+              <a:rPr lang="en-US" dirty="0"/>
+              <a:t>I have made the solution to our Week 3 lab available. My strong suggestion is to do you best on your own and using “normal” resources available to you (Web, classmates, etc.) and then use the solution as a last resort</a:t>
+            </a:r>
+            <a:r>
+              <a:rPr lang="en-US"/>
+              <a:t>. </a:t>
+            </a:r>
             <a:endParaRPr lang="en-US" dirty="0"/>
           </a:p>
         </p:txBody>
@@ -878,6 +891,90 @@
             <a:fld id="{5394DE12-7B9B-46AA-AC19-C30A49928B9B}" type="slidenum">
               <a:rPr lang="en-US" smtClean="0"/>
               <a:t>5</a:t>
+            </a:fld>
+            <a:endParaRPr lang="en-US" dirty="0"/>
+          </a:p>
+        </p:txBody>
+      </p:sp>
+    </p:spTree>
+    <p:extLst>
+      <p:ext uri="{BB962C8B-B14F-4D97-AF65-F5344CB8AC3E}">
+        <p14:creationId xmlns:p14="http://schemas.microsoft.com/office/powerpoint/2010/main" val="2032946705"/>
+      </p:ext>
+    </p:extLst>
+  </p:cSld>
+  <p:clrMapOvr>
+    <a:masterClrMapping/>
+  </p:clrMapOvr>
+</p:notes>
+</file>
+
+<file path=ppt/notesSlides/notesSlide6.xml><?xml version="1.0" encoding="utf-8"?>
+<p:notes xmlns:a="http://schemas.openxmlformats.org/drawingml/2006/main" xmlns:r="http://schemas.openxmlformats.org/officeDocument/2006/relationships" xmlns:p="http://schemas.openxmlformats.org/presentationml/2006/main">
+  <p:cSld>
+    <p:spTree>
+      <p:nvGrpSpPr>
+        <p:cNvPr id="1" name=""/>
+        <p:cNvGrpSpPr/>
+        <p:nvPr/>
+      </p:nvGrpSpPr>
+      <p:grpSpPr>
+        <a:xfrm>
+          <a:off x="0" y="0"/>
+          <a:ext cx="0" cy="0"/>
+          <a:chOff x="0" y="0"/>
+          <a:chExt cx="0" cy="0"/>
+        </a:xfrm>
+      </p:grpSpPr>
+      <p:sp>
+        <p:nvSpPr>
+          <p:cNvPr id="2" name="Slide Image Placeholder 1"/>
+          <p:cNvSpPr>
+            <a:spLocks noGrp="1" noRot="1" noChangeAspect="1"/>
+          </p:cNvSpPr>
+          <p:nvPr>
+            <p:ph type="sldImg"/>
+          </p:nvPr>
+        </p:nvSpPr>
+        <p:spPr/>
+      </p:sp>
+      <p:sp>
+        <p:nvSpPr>
+          <p:cNvPr id="3" name="Notes Placeholder 2"/>
+          <p:cNvSpPr>
+            <a:spLocks noGrp="1"/>
+          </p:cNvSpPr>
+          <p:nvPr>
+            <p:ph type="body" idx="1"/>
+          </p:nvPr>
+        </p:nvSpPr>
+        <p:spPr/>
+        <p:txBody>
+          <a:bodyPr/>
+          <a:lstStyle/>
+          <a:p>
+            <a:endParaRPr lang="en-US" dirty="0"/>
+          </a:p>
+        </p:txBody>
+      </p:sp>
+      <p:sp>
+        <p:nvSpPr>
+          <p:cNvPr id="4" name="Slide Number Placeholder 3"/>
+          <p:cNvSpPr>
+            <a:spLocks noGrp="1"/>
+          </p:cNvSpPr>
+          <p:nvPr>
+            <p:ph type="sldNum" sz="quarter" idx="10"/>
+          </p:nvPr>
+        </p:nvSpPr>
+        <p:spPr/>
+        <p:txBody>
+          <a:bodyPr/>
+          <a:lstStyle/>
+          <a:p>
+            <a:fld id="{5394DE12-7B9B-46AA-AC19-C30A49928B9B}" type="slidenum">
+              <a:rPr lang="en-US" smtClean="0"/>
+              <a:t>6</a:t>
             </a:fld>
             <a:endParaRPr lang="en-US" dirty="0"/>
           </a:p>
@@ -1043,7 +1140,7 @@
           <a:p>
             <a:fld id="{5FB62F81-FD80-4AA8-93CA-E835B40BE667}" type="datetimeFigureOut">
               <a:rPr lang="en-US" smtClean="0"/>
-              <a:t>9/28/2017</a:t>
+              <a:t>9/29/2017</a:t>
             </a:fld>
             <a:endParaRPr lang="en-US"/>
           </a:p>
@@ -1241,7 +1338,7 @@
           <a:p>
             <a:fld id="{5FB62F81-FD80-4AA8-93CA-E835B40BE667}" type="datetimeFigureOut">
               <a:rPr lang="en-US" smtClean="0"/>
-              <a:t>9/28/2017</a:t>
+              <a:t>9/29/2017</a:t>
             </a:fld>
             <a:endParaRPr lang="en-US"/>
           </a:p>
@@ -1449,7 +1546,7 @@
           <a:p>
             <a:fld id="{5FB62F81-FD80-4AA8-93CA-E835B40BE667}" type="datetimeFigureOut">
               <a:rPr lang="en-US" smtClean="0"/>
-              <a:t>9/28/2017</a:t>
+              <a:t>9/29/2017</a:t>
             </a:fld>
             <a:endParaRPr lang="en-US"/>
           </a:p>
@@ -1647,7 +1744,7 @@
           <a:p>
             <a:fld id="{5FB62F81-FD80-4AA8-93CA-E835B40BE667}" type="datetimeFigureOut">
               <a:rPr lang="en-US" smtClean="0"/>
-              <a:t>9/28/2017</a:t>
+              <a:t>9/29/2017</a:t>
             </a:fld>
             <a:endParaRPr lang="en-US"/>
           </a:p>
@@ -1922,7 +2019,7 @@
           <a:p>
             <a:fld id="{5FB62F81-FD80-4AA8-93CA-E835B40BE667}" type="datetimeFigureOut">
               <a:rPr lang="en-US" smtClean="0"/>
-              <a:t>9/28/2017</a:t>
+              <a:t>9/29/2017</a:t>
             </a:fld>
             <a:endParaRPr lang="en-US"/>
           </a:p>
@@ -2187,7 +2284,7 @@
           <a:p>
             <a:fld id="{5FB62F81-FD80-4AA8-93CA-E835B40BE667}" type="datetimeFigureOut">
               <a:rPr lang="en-US" smtClean="0"/>
-              <a:t>9/28/2017</a:t>
+              <a:t>9/29/2017</a:t>
             </a:fld>
             <a:endParaRPr lang="en-US"/>
           </a:p>
@@ -2599,7 +2696,7 @@
           <a:p>
             <a:fld id="{5FB62F81-FD80-4AA8-93CA-E835B40BE667}" type="datetimeFigureOut">
               <a:rPr lang="en-US" smtClean="0"/>
-              <a:t>9/28/2017</a:t>
+              <a:t>9/29/2017</a:t>
             </a:fld>
             <a:endParaRPr lang="en-US"/>
           </a:p>
@@ -2740,7 +2837,7 @@
           <a:p>
             <a:fld id="{5FB62F81-FD80-4AA8-93CA-E835B40BE667}" type="datetimeFigureOut">
               <a:rPr lang="en-US" smtClean="0"/>
-              <a:t>9/28/2017</a:t>
+              <a:t>9/29/2017</a:t>
             </a:fld>
             <a:endParaRPr lang="en-US"/>
           </a:p>
@@ -2853,7 +2950,7 @@
           <a:p>
             <a:fld id="{5FB62F81-FD80-4AA8-93CA-E835B40BE667}" type="datetimeFigureOut">
               <a:rPr lang="en-US" smtClean="0"/>
-              <a:t>9/28/2017</a:t>
+              <a:t>9/29/2017</a:t>
             </a:fld>
             <a:endParaRPr lang="en-US"/>
           </a:p>
@@ -3164,7 +3261,7 @@
           <a:p>
             <a:fld id="{5FB62F81-FD80-4AA8-93CA-E835B40BE667}" type="datetimeFigureOut">
               <a:rPr lang="en-US" smtClean="0"/>
-              <a:t>9/28/2017</a:t>
+              <a:t>9/29/2017</a:t>
             </a:fld>
             <a:endParaRPr lang="en-US"/>
           </a:p>
@@ -3452,7 +3549,7 @@
           <a:p>
             <a:fld id="{5FB62F81-FD80-4AA8-93CA-E835B40BE667}" type="datetimeFigureOut">
               <a:rPr lang="en-US" smtClean="0"/>
-              <a:t>9/28/2017</a:t>
+              <a:t>9/29/2017</a:t>
             </a:fld>
             <a:endParaRPr lang="en-US"/>
           </a:p>
@@ -3693,7 +3790,7 @@
           <a:p>
             <a:fld id="{5FB62F81-FD80-4AA8-93CA-E835B40BE667}" type="datetimeFigureOut">
               <a:rPr lang="en-US" smtClean="0"/>
-              <a:t>9/28/2017</a:t>
+              <a:t>9/29/2017</a:t>
             </a:fld>
             <a:endParaRPr lang="en-US"/>
           </a:p>
@@ -4207,6 +4304,26 @@
             </a:pPr>
             <a:r>
               <a:rPr lang="en-US" sz="2000" dirty="0"/>
+              <a:t>Review Assignments</a:t>
+            </a:r>
+          </a:p>
+          <a:p>
+            <a:pPr marL="457200" indent="-457200">
+              <a:buFont typeface="+mj-lt"/>
+              <a:buAutoNum type="arabicPeriod"/>
+            </a:pPr>
+            <a:r>
+              <a:rPr lang="en-US" sz="2000" dirty="0"/>
+              <a:t>Quiz 2 Results/Answers</a:t>
+            </a:r>
+          </a:p>
+          <a:p>
+            <a:pPr marL="457200" indent="-457200">
+              <a:buFont typeface="+mj-lt"/>
+              <a:buAutoNum type="arabicPeriod"/>
+            </a:pPr>
+            <a:r>
+              <a:rPr lang="en-US" sz="2000" dirty="0"/>
               <a:t>Week 5 Lab: JavaScript Basics</a:t>
             </a:r>
           </a:p>
@@ -4584,14 +4701,7 @@
           <a:p>
             <a:r>
               <a:rPr lang="en-US" sz="4800" dirty="0"/>
-              <a:t>Week 5 Lab:</a:t>
-            </a:r>
-            <a:br>
-              <a:rPr lang="en-US" sz="4800" dirty="0"/>
-            </a:br>
-            <a:r>
-              <a:rPr lang="en-US" sz="4800" dirty="0"/>
-              <a:t>Week 5 Lab: JavaScript Basics</a:t>
+              <a:t>Quiz 2 Results/Answers</a:t>
             </a:r>
           </a:p>
         </p:txBody>
@@ -4610,6 +4720,72 @@
 </file>
 
 <file path=ppt/slides/slide5.xml><?xml version="1.0" encoding="utf-8"?>
+<p:sld xmlns:a="http://schemas.openxmlformats.org/drawingml/2006/main" xmlns:r="http://schemas.openxmlformats.org/officeDocument/2006/relationships" xmlns:p="http://schemas.openxmlformats.org/presentationml/2006/main">
+  <p:cSld>
+    <p:spTree>
+      <p:nvGrpSpPr>
+        <p:cNvPr id="1" name=""/>
+        <p:cNvGrpSpPr/>
+        <p:nvPr/>
+      </p:nvGrpSpPr>
+      <p:grpSpPr>
+        <a:xfrm>
+          <a:off x="0" y="0"/>
+          <a:ext cx="0" cy="0"/>
+          <a:chOff x="0" y="0"/>
+          <a:chExt cx="0" cy="0"/>
+        </a:xfrm>
+      </p:grpSpPr>
+      <p:sp>
+        <p:nvSpPr>
+          <p:cNvPr id="2" name="Title 1"/>
+          <p:cNvSpPr>
+            <a:spLocks noGrp="1"/>
+          </p:cNvSpPr>
+          <p:nvPr>
+            <p:ph type="ctrTitle"/>
+          </p:nvPr>
+        </p:nvSpPr>
+        <p:spPr>
+          <a:xfrm>
+            <a:off x="1524000" y="1122362"/>
+            <a:ext cx="9144000" cy="3214925"/>
+          </a:xfrm>
+        </p:spPr>
+        <p:txBody>
+          <a:bodyPr>
+            <a:normAutofit/>
+          </a:bodyPr>
+          <a:lstStyle/>
+          <a:p>
+            <a:r>
+              <a:rPr lang="en-US" sz="4800" dirty="0"/>
+              <a:t>Week 5 Lab:</a:t>
+            </a:r>
+            <a:br>
+              <a:rPr lang="en-US" sz="4800" dirty="0"/>
+            </a:br>
+            <a:r>
+              <a:rPr lang="en-US" sz="4800" dirty="0"/>
+              <a:t>Week 5 Lab: JavaScript Basics</a:t>
+            </a:r>
+          </a:p>
+        </p:txBody>
+      </p:sp>
+    </p:spTree>
+    <p:extLst>
+      <p:ext uri="{BB962C8B-B14F-4D97-AF65-F5344CB8AC3E}">
+        <p14:creationId xmlns:p14="http://schemas.microsoft.com/office/powerpoint/2010/main" val="3973654728"/>
+      </p:ext>
+    </p:extLst>
+  </p:cSld>
+  <p:clrMapOvr>
+    <a:masterClrMapping/>
+  </p:clrMapOvr>
+</p:sld>
+</file>
+
+<file path=ppt/slides/slide6.xml><?xml version="1.0" encoding="utf-8"?>
 <p:sld xmlns:a="http://schemas.openxmlformats.org/drawingml/2006/main" xmlns:r="http://schemas.openxmlformats.org/officeDocument/2006/relationships" xmlns:p="http://schemas.openxmlformats.org/presentationml/2006/main">
   <p:cSld>
     <p:bg>

</xml_diff>